<commit_message>
Aesthetic edits to paper (of course I made the logo bigger).
</commit_message>
<xml_diff>
--- a/presentations/Paper_Parser_Poster.pptx
+++ b/presentations/Paper_Parser_Poster.pptx
@@ -254,7 +254,7 @@
           <a:p>
             <a:fld id="{8A650380-BA87-410E-85F4-EC09A1176156}" type="datetimeFigureOut">
               <a:rPr lang="en-US" smtClean="0"/>
-              <a:t>2019-03-14</a:t>
+              <a:t>3/15/19</a:t>
             </a:fld>
             <a:endParaRPr lang="en-US"/>
           </a:p>
@@ -424,7 +424,7 @@
           <a:p>
             <a:fld id="{8A650380-BA87-410E-85F4-EC09A1176156}" type="datetimeFigureOut">
               <a:rPr lang="en-US" smtClean="0"/>
-              <a:t>2019-03-14</a:t>
+              <a:t>3/15/19</a:t>
             </a:fld>
             <a:endParaRPr lang="en-US"/>
           </a:p>
@@ -604,7 +604,7 @@
           <a:p>
             <a:fld id="{8A650380-BA87-410E-85F4-EC09A1176156}" type="datetimeFigureOut">
               <a:rPr lang="en-US" smtClean="0"/>
-              <a:t>2019-03-14</a:t>
+              <a:t>3/15/19</a:t>
             </a:fld>
             <a:endParaRPr lang="en-US"/>
           </a:p>
@@ -774,7 +774,7 @@
           <a:p>
             <a:fld id="{8A650380-BA87-410E-85F4-EC09A1176156}" type="datetimeFigureOut">
               <a:rPr lang="en-US" smtClean="0"/>
-              <a:t>2019-03-14</a:t>
+              <a:t>3/15/19</a:t>
             </a:fld>
             <a:endParaRPr lang="en-US"/>
           </a:p>
@@ -1018,7 +1018,7 @@
           <a:p>
             <a:fld id="{8A650380-BA87-410E-85F4-EC09A1176156}" type="datetimeFigureOut">
               <a:rPr lang="en-US" smtClean="0"/>
-              <a:t>2019-03-14</a:t>
+              <a:t>3/15/19</a:t>
             </a:fld>
             <a:endParaRPr lang="en-US"/>
           </a:p>
@@ -1250,7 +1250,7 @@
           <a:p>
             <a:fld id="{8A650380-BA87-410E-85F4-EC09A1176156}" type="datetimeFigureOut">
               <a:rPr lang="en-US" smtClean="0"/>
-              <a:t>2019-03-14</a:t>
+              <a:t>3/15/19</a:t>
             </a:fld>
             <a:endParaRPr lang="en-US"/>
           </a:p>
@@ -1617,7 +1617,7 @@
           <a:p>
             <a:fld id="{8A650380-BA87-410E-85F4-EC09A1176156}" type="datetimeFigureOut">
               <a:rPr lang="en-US" smtClean="0"/>
-              <a:t>2019-03-14</a:t>
+              <a:t>3/15/19</a:t>
             </a:fld>
             <a:endParaRPr lang="en-US"/>
           </a:p>
@@ -1735,7 +1735,7 @@
           <a:p>
             <a:fld id="{8A650380-BA87-410E-85F4-EC09A1176156}" type="datetimeFigureOut">
               <a:rPr lang="en-US" smtClean="0"/>
-              <a:t>2019-03-14</a:t>
+              <a:t>3/15/19</a:t>
             </a:fld>
             <a:endParaRPr lang="en-US"/>
           </a:p>
@@ -1830,7 +1830,7 @@
           <a:p>
             <a:fld id="{8A650380-BA87-410E-85F4-EC09A1176156}" type="datetimeFigureOut">
               <a:rPr lang="en-US" smtClean="0"/>
-              <a:t>2019-03-14</a:t>
+              <a:t>3/15/19</a:t>
             </a:fld>
             <a:endParaRPr lang="en-US"/>
           </a:p>
@@ -2107,7 +2107,7 @@
           <a:p>
             <a:fld id="{8A650380-BA87-410E-85F4-EC09A1176156}" type="datetimeFigureOut">
               <a:rPr lang="en-US" smtClean="0"/>
-              <a:t>2019-03-14</a:t>
+              <a:t>3/15/19</a:t>
             </a:fld>
             <a:endParaRPr lang="en-US"/>
           </a:p>
@@ -2364,7 +2364,7 @@
           <a:p>
             <a:fld id="{8A650380-BA87-410E-85F4-EC09A1176156}" type="datetimeFigureOut">
               <a:rPr lang="en-US" smtClean="0"/>
-              <a:t>2019-03-14</a:t>
+              <a:t>3/15/19</a:t>
             </a:fld>
             <a:endParaRPr lang="en-US"/>
           </a:p>
@@ -2577,7 +2577,7 @@
           <a:p>
             <a:fld id="{8A650380-BA87-410E-85F4-EC09A1176156}" type="datetimeFigureOut">
               <a:rPr lang="en-US" smtClean="0"/>
-              <a:t>2019-03-14</a:t>
+              <a:t>3/15/19</a:t>
             </a:fld>
             <a:endParaRPr lang="en-US"/>
           </a:p>
@@ -3911,7 +3911,7 @@
         <p:spPr>
           <a:xfrm>
             <a:off x="-12173" y="31653406"/>
-            <a:ext cx="43903373" cy="1222548"/>
+            <a:ext cx="33556227" cy="1222548"/>
           </a:xfrm>
           <a:prstGeom prst="rect">
             <a:avLst/>
@@ -9311,7 +9311,7 @@
           </a:ln>
           <a:extLst>
             <a:ext uri="{C572A759-6A51-4108-AA02-DFA0A04FC94B}">
-              <ma14:wrappingTextBoxFlag xmlns="" xmlns:m="http://schemas.openxmlformats.org/officeDocument/2006/math" xmlns:a14="http://schemas.microsoft.com/office/drawing/2010/main" xmlns:ma14="http://schemas.microsoft.com/office/mac/drawingml/2011/main" val="1"/>
+              <ma14:wrappingTextBoxFlag xmlns:ma14="http://schemas.microsoft.com/office/mac/drawingml/2011/main" xmlns:a14="http://schemas.microsoft.com/office/drawing/2010/main" xmlns:m="http://schemas.openxmlformats.org/officeDocument/2006/math" xmlns="" val="1"/>
             </a:ext>
           </a:extLst>
         </p:spPr>
@@ -9405,10 +9405,10 @@
         </p:nvGrpSpPr>
         <p:grpSpPr>
           <a:xfrm>
-            <a:off x="32512423" y="7318604"/>
-            <a:ext cx="10597332" cy="7618403"/>
-            <a:chOff x="32478830" y="6984598"/>
-            <a:chExt cx="10597332" cy="7618403"/>
+            <a:off x="32571417" y="7260124"/>
+            <a:ext cx="10597332" cy="7847003"/>
+            <a:chOff x="32478830" y="6755998"/>
+            <a:chExt cx="10597332" cy="7847003"/>
           </a:xfrm>
         </p:grpSpPr>
         <p:sp>
@@ -9479,7 +9479,7 @@
           </p:nvSpPr>
           <p:spPr>
             <a:xfrm>
-              <a:off x="36021278" y="6984598"/>
+              <a:off x="36021278" y="6755998"/>
               <a:ext cx="3133806" cy="597353"/>
             </a:xfrm>
             <a:prstGeom prst="roundRect">
@@ -9494,7 +9494,7 @@
             </a:ln>
             <a:extLst>
               <a:ext uri="{C572A759-6A51-4108-AA02-DFA0A04FC94B}">
-                <ma14:wrappingTextBoxFlag xmlns="" xmlns:m="http://schemas.openxmlformats.org/officeDocument/2006/math" xmlns:a14="http://schemas.microsoft.com/office/drawing/2010/main" xmlns:ma14="http://schemas.microsoft.com/office/mac/drawingml/2011/main" val="1"/>
+                <ma14:wrappingTextBoxFlag xmlns:ma14="http://schemas.microsoft.com/office/mac/drawingml/2011/main" xmlns:a14="http://schemas.microsoft.com/office/drawing/2010/main" xmlns:m="http://schemas.openxmlformats.org/officeDocument/2006/math" xmlns="" val="1"/>
               </a:ext>
             </a:extLst>
           </p:spPr>
@@ -9568,7 +9568,7 @@
             </a:ln>
             <a:extLst>
               <a:ext uri="{C572A759-6A51-4108-AA02-DFA0A04FC94B}">
-                <ma14:wrappingTextBoxFlag xmlns="" xmlns:m="http://schemas.openxmlformats.org/officeDocument/2006/math" xmlns:a14="http://schemas.microsoft.com/office/drawing/2010/main" xmlns:ma14="http://schemas.microsoft.com/office/mac/drawingml/2011/main" val="1"/>
+                <ma14:wrappingTextBoxFlag xmlns:ma14="http://schemas.microsoft.com/office/mac/drawingml/2011/main" xmlns:a14="http://schemas.microsoft.com/office/drawing/2010/main" xmlns:m="http://schemas.openxmlformats.org/officeDocument/2006/math" xmlns="" val="1"/>
               </a:ext>
             </a:extLst>
           </p:spPr>
@@ -9639,7 +9639,7 @@
             </a:ln>
             <a:extLst>
               <a:ext uri="{C572A759-6A51-4108-AA02-DFA0A04FC94B}">
-                <ma14:wrappingTextBoxFlag xmlns="" xmlns:m="http://schemas.openxmlformats.org/officeDocument/2006/math" xmlns:a14="http://schemas.microsoft.com/office/drawing/2010/main" xmlns:ma14="http://schemas.microsoft.com/office/mac/drawingml/2011/main" val="1"/>
+                <ma14:wrappingTextBoxFlag xmlns:ma14="http://schemas.microsoft.com/office/mac/drawingml/2011/main" xmlns:a14="http://schemas.microsoft.com/office/drawing/2010/main" xmlns:m="http://schemas.openxmlformats.org/officeDocument/2006/math" xmlns="" val="1"/>
               </a:ext>
             </a:extLst>
           </p:spPr>
@@ -9708,7 +9708,7 @@
             </a:ln>
             <a:extLst>
               <a:ext uri="{C572A759-6A51-4108-AA02-DFA0A04FC94B}">
-                <ma14:wrappingTextBoxFlag xmlns="" xmlns:m="http://schemas.openxmlformats.org/officeDocument/2006/math" xmlns:a14="http://schemas.microsoft.com/office/drawing/2010/main" xmlns:ma14="http://schemas.microsoft.com/office/mac/drawingml/2011/main" val="1"/>
+                <ma14:wrappingTextBoxFlag xmlns:ma14="http://schemas.microsoft.com/office/mac/drawingml/2011/main" xmlns:a14="http://schemas.microsoft.com/office/drawing/2010/main" xmlns:m="http://schemas.openxmlformats.org/officeDocument/2006/math" xmlns="" val="1"/>
               </a:ext>
             </a:extLst>
           </p:spPr>
@@ -9777,7 +9777,7 @@
             </a:ln>
             <a:extLst>
               <a:ext uri="{C572A759-6A51-4108-AA02-DFA0A04FC94B}">
-                <ma14:wrappingTextBoxFlag xmlns="" xmlns:m="http://schemas.openxmlformats.org/officeDocument/2006/math" xmlns:a14="http://schemas.microsoft.com/office/drawing/2010/main" xmlns:ma14="http://schemas.microsoft.com/office/mac/drawingml/2011/main" val="1"/>
+                <ma14:wrappingTextBoxFlag xmlns:ma14="http://schemas.microsoft.com/office/mac/drawingml/2011/main" xmlns:a14="http://schemas.microsoft.com/office/drawing/2010/main" xmlns:m="http://schemas.openxmlformats.org/officeDocument/2006/math" xmlns="" val="1"/>
               </a:ext>
             </a:extLst>
           </p:spPr>
@@ -9846,7 +9846,7 @@
             </a:ln>
             <a:extLst>
               <a:ext uri="{C572A759-6A51-4108-AA02-DFA0A04FC94B}">
-                <ma14:wrappingTextBoxFlag xmlns="" xmlns:m="http://schemas.openxmlformats.org/officeDocument/2006/math" xmlns:a14="http://schemas.microsoft.com/office/drawing/2010/main" xmlns:ma14="http://schemas.microsoft.com/office/mac/drawingml/2011/main" val="1"/>
+                <ma14:wrappingTextBoxFlag xmlns:ma14="http://schemas.microsoft.com/office/mac/drawingml/2011/main" xmlns:a14="http://schemas.microsoft.com/office/drawing/2010/main" xmlns:m="http://schemas.openxmlformats.org/officeDocument/2006/math" xmlns="" val="1"/>
               </a:ext>
             </a:extLst>
           </p:spPr>
@@ -9915,7 +9915,7 @@
             </a:ln>
             <a:extLst>
               <a:ext uri="{C572A759-6A51-4108-AA02-DFA0A04FC94B}">
-                <ma14:wrappingTextBoxFlag xmlns="" xmlns:m="http://schemas.openxmlformats.org/officeDocument/2006/math" xmlns:a14="http://schemas.microsoft.com/office/drawing/2010/main" xmlns:ma14="http://schemas.microsoft.com/office/mac/drawingml/2011/main" val="1"/>
+                <ma14:wrappingTextBoxFlag xmlns:ma14="http://schemas.microsoft.com/office/mac/drawingml/2011/main" xmlns:a14="http://schemas.microsoft.com/office/drawing/2010/main" xmlns:m="http://schemas.openxmlformats.org/officeDocument/2006/math" xmlns="" val="1"/>
               </a:ext>
             </a:extLst>
           </p:spPr>
@@ -9987,7 +9987,7 @@
             </a:ln>
             <a:extLst>
               <a:ext uri="{C572A759-6A51-4108-AA02-DFA0A04FC94B}">
-                <ma14:wrappingTextBoxFlag xmlns="" xmlns:m="http://schemas.openxmlformats.org/officeDocument/2006/math" xmlns:a14="http://schemas.microsoft.com/office/drawing/2010/main" xmlns:ma14="http://schemas.microsoft.com/office/mac/drawingml/2011/main" val="1"/>
+                <ma14:wrappingTextBoxFlag xmlns:ma14="http://schemas.microsoft.com/office/mac/drawingml/2011/main" xmlns:a14="http://schemas.microsoft.com/office/drawing/2010/main" xmlns:m="http://schemas.openxmlformats.org/officeDocument/2006/math" xmlns="" val="1"/>
               </a:ext>
             </a:extLst>
           </p:spPr>
@@ -10059,7 +10059,7 @@
             </a:ln>
             <a:extLst>
               <a:ext uri="{C572A759-6A51-4108-AA02-DFA0A04FC94B}">
-                <ma14:wrappingTextBoxFlag xmlns="" xmlns:m="http://schemas.openxmlformats.org/officeDocument/2006/math" xmlns:a14="http://schemas.microsoft.com/office/drawing/2010/main" xmlns:ma14="http://schemas.microsoft.com/office/mac/drawingml/2011/main" val="1"/>
+                <ma14:wrappingTextBoxFlag xmlns:ma14="http://schemas.microsoft.com/office/mac/drawingml/2011/main" xmlns:a14="http://schemas.microsoft.com/office/drawing/2010/main" xmlns:m="http://schemas.openxmlformats.org/officeDocument/2006/math" xmlns="" val="1"/>
               </a:ext>
             </a:extLst>
           </p:spPr>
@@ -10124,7 +10124,7 @@
             <a:ln/>
             <a:extLst>
               <a:ext uri="{C572A759-6A51-4108-AA02-DFA0A04FC94B}">
-                <ma14:wrappingTextBoxFlag xmlns="" xmlns:m="http://schemas.openxmlformats.org/officeDocument/2006/math" xmlns:a14="http://schemas.microsoft.com/office/drawing/2010/main" xmlns:ma14="http://schemas.microsoft.com/office/mac/drawingml/2011/main" val="1"/>
+                <ma14:wrappingTextBoxFlag xmlns:ma14="http://schemas.microsoft.com/office/mac/drawingml/2011/main" xmlns:a14="http://schemas.microsoft.com/office/drawing/2010/main" xmlns:m="http://schemas.openxmlformats.org/officeDocument/2006/math" xmlns="" val="1"/>
               </a:ext>
             </a:extLst>
           </p:spPr>
@@ -10196,7 +10196,7 @@
             </a:ln>
             <a:extLst>
               <a:ext uri="{C572A759-6A51-4108-AA02-DFA0A04FC94B}">
-                <ma14:wrappingTextBoxFlag xmlns="" xmlns:m="http://schemas.openxmlformats.org/officeDocument/2006/math" xmlns:a14="http://schemas.microsoft.com/office/drawing/2010/main" xmlns:ma14="http://schemas.microsoft.com/office/mac/drawingml/2011/main" val="1"/>
+                <ma14:wrappingTextBoxFlag xmlns:ma14="http://schemas.microsoft.com/office/mac/drawingml/2011/main" xmlns:a14="http://schemas.microsoft.com/office/drawing/2010/main" xmlns:m="http://schemas.openxmlformats.org/officeDocument/2006/math" xmlns="" val="1"/>
               </a:ext>
             </a:extLst>
           </p:spPr>
@@ -10266,7 +10266,7 @@
             </a:ln>
             <a:extLst>
               <a:ext uri="{C572A759-6A51-4108-AA02-DFA0A04FC94B}">
-                <ma14:wrappingTextBoxFlag xmlns="" xmlns:m="http://schemas.openxmlformats.org/officeDocument/2006/math" xmlns:a14="http://schemas.microsoft.com/office/drawing/2010/main" xmlns:ma14="http://schemas.microsoft.com/office/mac/drawingml/2011/main" val="1"/>
+                <ma14:wrappingTextBoxFlag xmlns:ma14="http://schemas.microsoft.com/office/mac/drawingml/2011/main" xmlns:a14="http://schemas.microsoft.com/office/drawing/2010/main" xmlns:m="http://schemas.openxmlformats.org/officeDocument/2006/math" xmlns="" val="1"/>
               </a:ext>
             </a:extLst>
           </p:spPr>
@@ -10349,7 +10349,7 @@
             <a:ln/>
             <a:extLst>
               <a:ext uri="{C572A759-6A51-4108-AA02-DFA0A04FC94B}">
-                <ma14:wrappingTextBoxFlag xmlns="" xmlns:m="http://schemas.openxmlformats.org/officeDocument/2006/math" xmlns:a14="http://schemas.microsoft.com/office/drawing/2010/main" xmlns:ma14="http://schemas.microsoft.com/office/mac/drawingml/2011/main" val="1"/>
+                <ma14:wrappingTextBoxFlag xmlns:ma14="http://schemas.microsoft.com/office/mac/drawingml/2011/main" xmlns:a14="http://schemas.microsoft.com/office/drawing/2010/main" xmlns:m="http://schemas.openxmlformats.org/officeDocument/2006/math" xmlns="" val="1"/>
               </a:ext>
             </a:extLst>
           </p:spPr>
@@ -10414,7 +10414,7 @@
             <a:ln/>
             <a:extLst>
               <a:ext uri="{C572A759-6A51-4108-AA02-DFA0A04FC94B}">
-                <ma14:wrappingTextBoxFlag xmlns="" xmlns:m="http://schemas.openxmlformats.org/officeDocument/2006/math" xmlns:a14="http://schemas.microsoft.com/office/drawing/2010/main" xmlns:ma14="http://schemas.microsoft.com/office/mac/drawingml/2011/main" val="1"/>
+                <ma14:wrappingTextBoxFlag xmlns:ma14="http://schemas.microsoft.com/office/mac/drawingml/2011/main" xmlns:a14="http://schemas.microsoft.com/office/drawing/2010/main" xmlns:m="http://schemas.openxmlformats.org/officeDocument/2006/math" xmlns="" val="1"/>
               </a:ext>
             </a:extLst>
           </p:spPr>
@@ -10479,7 +10479,7 @@
             <a:ln/>
             <a:extLst>
               <a:ext uri="{C572A759-6A51-4108-AA02-DFA0A04FC94B}">
-                <ma14:wrappingTextBoxFlag xmlns="" xmlns:m="http://schemas.openxmlformats.org/officeDocument/2006/math" xmlns:a14="http://schemas.microsoft.com/office/drawing/2010/main" xmlns:ma14="http://schemas.microsoft.com/office/mac/drawingml/2011/main" val="1"/>
+                <ma14:wrappingTextBoxFlag xmlns:ma14="http://schemas.microsoft.com/office/mac/drawingml/2011/main" xmlns:a14="http://schemas.microsoft.com/office/drawing/2010/main" xmlns:m="http://schemas.openxmlformats.org/officeDocument/2006/math" xmlns="" val="1"/>
               </a:ext>
             </a:extLst>
           </p:spPr>
@@ -10544,7 +10544,7 @@
             <a:ln/>
             <a:extLst>
               <a:ext uri="{C572A759-6A51-4108-AA02-DFA0A04FC94B}">
-                <ma14:wrappingTextBoxFlag xmlns="" xmlns:m="http://schemas.openxmlformats.org/officeDocument/2006/math" xmlns:a14="http://schemas.microsoft.com/office/drawing/2010/main" xmlns:ma14="http://schemas.microsoft.com/office/mac/drawingml/2011/main" val="1"/>
+                <ma14:wrappingTextBoxFlag xmlns:ma14="http://schemas.microsoft.com/office/mac/drawingml/2011/main" xmlns:a14="http://schemas.microsoft.com/office/drawing/2010/main" xmlns:m="http://schemas.openxmlformats.org/officeDocument/2006/math" xmlns="" val="1"/>
               </a:ext>
             </a:extLst>
           </p:spPr>
@@ -10609,7 +10609,7 @@
             <a:ln/>
             <a:extLst>
               <a:ext uri="{C572A759-6A51-4108-AA02-DFA0A04FC94B}">
-                <ma14:wrappingTextBoxFlag xmlns="" xmlns:m="http://schemas.openxmlformats.org/officeDocument/2006/math" xmlns:a14="http://schemas.microsoft.com/office/drawing/2010/main" xmlns:ma14="http://schemas.microsoft.com/office/mac/drawingml/2011/main" val="1"/>
+                <ma14:wrappingTextBoxFlag xmlns:ma14="http://schemas.microsoft.com/office/mac/drawingml/2011/main" xmlns:a14="http://schemas.microsoft.com/office/drawing/2010/main" xmlns:m="http://schemas.openxmlformats.org/officeDocument/2006/math" xmlns="" val="1"/>
               </a:ext>
             </a:extLst>
           </p:spPr>
@@ -10674,7 +10674,7 @@
             <a:ln/>
             <a:extLst>
               <a:ext uri="{C572A759-6A51-4108-AA02-DFA0A04FC94B}">
-                <ma14:wrappingTextBoxFlag xmlns="" xmlns:m="http://schemas.openxmlformats.org/officeDocument/2006/math" xmlns:a14="http://schemas.microsoft.com/office/drawing/2010/main" xmlns:ma14="http://schemas.microsoft.com/office/mac/drawingml/2011/main" val="1"/>
+                <ma14:wrappingTextBoxFlag xmlns:ma14="http://schemas.microsoft.com/office/mac/drawingml/2011/main" xmlns:a14="http://schemas.microsoft.com/office/drawing/2010/main" xmlns:m="http://schemas.openxmlformats.org/officeDocument/2006/math" xmlns="" val="1"/>
               </a:ext>
             </a:extLst>
           </p:spPr>
@@ -10730,8 +10730,8 @@
           </p:nvCxnSpPr>
           <p:spPr>
             <a:xfrm flipH="1">
-              <a:off x="35946082" y="7600013"/>
-              <a:ext cx="195203" cy="294307"/>
+              <a:off x="35946083" y="7367611"/>
+              <a:ext cx="188822" cy="526709"/>
             </a:xfrm>
             <a:prstGeom prst="straightConnector1">
               <a:avLst/>
@@ -11289,7 +11289,7 @@
             </a:ln>
             <a:extLst>
               <a:ext uri="{C572A759-6A51-4108-AA02-DFA0A04FC94B}">
-                <ma14:wrappingTextBoxFlag xmlns="" xmlns:m="http://schemas.openxmlformats.org/officeDocument/2006/math" xmlns:a14="http://schemas.microsoft.com/office/drawing/2010/main" xmlns:ma14="http://schemas.microsoft.com/office/mac/drawingml/2011/main" val="1"/>
+                <ma14:wrappingTextBoxFlag xmlns:ma14="http://schemas.microsoft.com/office/mac/drawingml/2011/main" xmlns:a14="http://schemas.microsoft.com/office/drawing/2010/main" xmlns:m="http://schemas.openxmlformats.org/officeDocument/2006/math" xmlns="" val="1"/>
               </a:ext>
             </a:extLst>
           </p:spPr>
@@ -11364,7 +11364,7 @@
             </a:ln>
             <a:extLst>
               <a:ext uri="{C572A759-6A51-4108-AA02-DFA0A04FC94B}">
-                <ma14:wrappingTextBoxFlag xmlns="" xmlns:m="http://schemas.openxmlformats.org/officeDocument/2006/math" xmlns:a14="http://schemas.microsoft.com/office/drawing/2010/main" xmlns:ma14="http://schemas.microsoft.com/office/mac/drawingml/2011/main" val="1"/>
+                <ma14:wrappingTextBoxFlag xmlns:ma14="http://schemas.microsoft.com/office/mac/drawingml/2011/main" xmlns:a14="http://schemas.microsoft.com/office/drawing/2010/main" xmlns:m="http://schemas.openxmlformats.org/officeDocument/2006/math" xmlns="" val="1"/>
               </a:ext>
             </a:extLst>
           </p:spPr>
@@ -11436,7 +11436,7 @@
             </a:ln>
             <a:extLst>
               <a:ext uri="{C572A759-6A51-4108-AA02-DFA0A04FC94B}">
-                <ma14:wrappingTextBoxFlag xmlns="" xmlns:m="http://schemas.openxmlformats.org/officeDocument/2006/math" xmlns:a14="http://schemas.microsoft.com/office/drawing/2010/main" xmlns:ma14="http://schemas.microsoft.com/office/mac/drawingml/2011/main" val="1"/>
+                <ma14:wrappingTextBoxFlag xmlns:ma14="http://schemas.microsoft.com/office/mac/drawingml/2011/main" xmlns:a14="http://schemas.microsoft.com/office/drawing/2010/main" xmlns:m="http://schemas.openxmlformats.org/officeDocument/2006/math" xmlns="" val="1"/>
               </a:ext>
             </a:extLst>
           </p:spPr>
@@ -11791,8 +11791,8 @@
           </p:nvCxnSpPr>
           <p:spPr>
             <a:xfrm>
-              <a:off x="39064367" y="7570033"/>
-              <a:ext cx="194872" cy="284813"/>
+              <a:off x="39034977" y="7353351"/>
+              <a:ext cx="224262" cy="501495"/>
             </a:xfrm>
             <a:prstGeom prst="straightConnector1">
               <a:avLst/>
@@ -11865,7 +11865,7 @@
               </a:ln>
               <a:extLst>
                 <a:ext uri="{C572A759-6A51-4108-AA02-DFA0A04FC94B}">
-                  <ma14:wrappingTextBoxFlag xmlns="" xmlns:m="http://schemas.openxmlformats.org/officeDocument/2006/math" xmlns:a14="http://schemas.microsoft.com/office/drawing/2010/main" xmlns:ma14="http://schemas.microsoft.com/office/mac/drawingml/2011/main" val="1"/>
+                  <ma14:wrappingTextBoxFlag xmlns:ma14="http://schemas.microsoft.com/office/mac/drawingml/2011/main" xmlns:a14="http://schemas.microsoft.com/office/drawing/2010/main" xmlns:m="http://schemas.openxmlformats.org/officeDocument/2006/math" xmlns="" val="1"/>
                 </a:ext>
               </a:extLst>
             </p:spPr>
@@ -11943,7 +11943,7 @@
               </a:ln>
               <a:extLst>
                 <a:ext uri="{C572A759-6A51-4108-AA02-DFA0A04FC94B}">
-                  <ma14:wrappingTextBoxFlag xmlns="" xmlns:m="http://schemas.openxmlformats.org/officeDocument/2006/math" xmlns:a14="http://schemas.microsoft.com/office/drawing/2010/main" xmlns:ma14="http://schemas.microsoft.com/office/mac/drawingml/2011/main" val="1"/>
+                  <ma14:wrappingTextBoxFlag xmlns:ma14="http://schemas.microsoft.com/office/mac/drawingml/2011/main" xmlns:a14="http://schemas.microsoft.com/office/drawing/2010/main" xmlns:m="http://schemas.openxmlformats.org/officeDocument/2006/math" xmlns="" val="1"/>
                 </a:ext>
               </a:extLst>
             </p:spPr>
@@ -12022,7 +12022,7 @@
               </a:ln>
               <a:extLst>
                 <a:ext uri="{C572A759-6A51-4108-AA02-DFA0A04FC94B}">
-                  <ma14:wrappingTextBoxFlag xmlns="" xmlns:m="http://schemas.openxmlformats.org/officeDocument/2006/math" xmlns:a14="http://schemas.microsoft.com/office/drawing/2010/main" xmlns:ma14="http://schemas.microsoft.com/office/mac/drawingml/2011/main" val="1"/>
+                  <ma14:wrappingTextBoxFlag xmlns:ma14="http://schemas.microsoft.com/office/mac/drawingml/2011/main" xmlns:a14="http://schemas.microsoft.com/office/drawing/2010/main" xmlns:m="http://schemas.openxmlformats.org/officeDocument/2006/math" xmlns="" val="1"/>
                 </a:ext>
               </a:extLst>
             </p:spPr>
@@ -12754,7 +12754,7 @@
         </p:blipFill>
         <p:spPr bwMode="auto">
           <a:xfrm>
-            <a:off x="2725626" y="25171914"/>
+            <a:off x="2725626" y="25286217"/>
             <a:ext cx="6676195" cy="6095366"/>
           </a:xfrm>
           <a:prstGeom prst="rect">
@@ -12823,8 +12823,8 @@
         </p:nvSpPr>
         <p:spPr>
           <a:xfrm>
-            <a:off x="607718" y="24502527"/>
-            <a:ext cx="10458312" cy="630942"/>
+            <a:off x="497813" y="24619039"/>
+            <a:ext cx="11162596" cy="630942"/>
           </a:xfrm>
           <a:prstGeom prst="rect">
             <a:avLst/>
@@ -12832,7 +12832,7 @@
           <a:noFill/>
         </p:spPr>
         <p:txBody>
-          <a:bodyPr wrap="none" rtlCol="0">
+          <a:bodyPr wrap="square" rtlCol="0">
             <a:spAutoFit/>
           </a:bodyPr>
           <a:lstStyle/>
@@ -13000,8 +13000,8 @@
         </p:blipFill>
         <p:spPr>
           <a:xfrm>
-            <a:off x="22493787" y="22604372"/>
-            <a:ext cx="9262235" cy="5032882"/>
+            <a:off x="22327061" y="22506470"/>
+            <a:ext cx="9622582" cy="5228686"/>
           </a:xfrm>
           <a:prstGeom prst="rect">
             <a:avLst/>
@@ -13757,7 +13757,7 @@
           </p:cNvPicPr>
           <p:nvPr/>
         </p:nvPicPr>
-        <p:blipFill>
+        <p:blipFill rotWithShape="1">
           <a:blip r:embed="rId13">
             <a:extLst>
               <a:ext uri="{28A0092B-C50C-407E-A947-70E740481C1C}">
@@ -13765,15 +13765,13 @@
               </a:ext>
             </a:extLst>
           </a:blip>
-          <a:srcRect/>
-          <a:stretch>
-            <a:fillRect/>
-          </a:stretch>
+          <a:srcRect b="16211"/>
+          <a:stretch/>
         </p:blipFill>
         <p:spPr bwMode="auto">
           <a:xfrm>
-            <a:off x="4056222" y="330861"/>
-            <a:ext cx="2576838" cy="3702058"/>
+            <a:off x="1847165" y="78446"/>
+            <a:ext cx="3733924" cy="4494786"/>
           </a:xfrm>
           <a:prstGeom prst="rect">
             <a:avLst/>
@@ -14570,7 +14568,7 @@
         </p:nvGrpSpPr>
         <p:grpSpPr>
           <a:xfrm>
-            <a:off x="36825087" y="834223"/>
+            <a:off x="38155799" y="1718327"/>
             <a:ext cx="4197905" cy="1446550"/>
             <a:chOff x="37603791" y="1496696"/>
             <a:chExt cx="4197905" cy="1446550"/>
@@ -15011,8 +15009,8 @@
         </p:blipFill>
         <p:spPr>
           <a:xfrm>
-            <a:off x="12327505" y="20168625"/>
-            <a:ext cx="9278245" cy="1949406"/>
+            <a:off x="12051516" y="20110639"/>
+            <a:ext cx="9830224" cy="2065378"/>
           </a:xfrm>
           <a:prstGeom prst="rect">
             <a:avLst/>
@@ -15047,8 +15045,8 @@
         </p:blipFill>
         <p:spPr>
           <a:xfrm>
-            <a:off x="12377291" y="22980917"/>
-            <a:ext cx="9178671" cy="1392626"/>
+            <a:off x="12017164" y="22926277"/>
+            <a:ext cx="9898926" cy="1501906"/>
           </a:xfrm>
           <a:prstGeom prst="rect">
             <a:avLst/>

</xml_diff>